<commit_message>
Implemented PPTX Image Insertion, all tests pass
Plus added new test specifically for this.
</commit_message>
<xml_diff>
--- a/examples/imagePresentationExample.pptx
+++ b/examples/imagePresentationExample.pptx
@@ -3097,46 +3097,86 @@
       </p:grpSpPr>
       <p:sp>
         <p:nvSpPr>
-          <p:cNvPr id="2" name="Title 1"/>
-          <p:cNvSpPr>
-            <a:spLocks noGrp="1"/>
-          </p:cNvSpPr>
-          <p:nvPr>
-            <p:ph type="ctrTitle"/>
-          </p:nvPr>
-        </p:nvSpPr>
-        <p:spPr/>
-        <p:txBody>
-          <a:bodyPr/>
-          <a:lstStyle/>
+          <p:cNvPr id="6" name="TextBox 5"/>
+          <p:cNvSpPr txBox="1"/>
+          <p:nvPr/>
+        </p:nvSpPr>
+        <p:spPr>
+          <a:xfrm>
+            <a:off x="1115616" y="548680"/>
+            <a:ext cx="6480720" cy="5632311"/>
+          </a:xfrm>
+          <a:prstGeom prst="rect">
+            <a:avLst/>
+          </a:prstGeom>
+          <a:noFill/>
+        </p:spPr>
+        <p:txBody>
+          <a:bodyPr wrap="square" rtlCol="0">
+            <a:spAutoFit/>
+          </a:bodyPr>
+          <a:lstStyle/>
+          <a:p>
+            <a:endParaRPr lang="en-GB" dirty="0" smtClean="0"/>
+          </a:p>
           <a:p>
             <a:r>
               <a:rPr lang="en-GB" dirty="0" smtClean="0"/>
               <a:t>{%image}</a:t>
             </a:r>
+          </a:p>
+          <a:p>
             <a:endParaRPr lang="en-GB" dirty="0"/>
           </a:p>
-        </p:txBody>
-      </p:sp>
-      <p:sp>
-        <p:nvSpPr>
-          <p:cNvPr id="3" name="Subtitle 2"/>
-          <p:cNvSpPr>
-            <a:spLocks noGrp="1"/>
-          </p:cNvSpPr>
-          <p:nvPr>
-            <p:ph type="subTitle" idx="1"/>
-          </p:nvPr>
-        </p:nvSpPr>
-        <p:spPr/>
-        <p:txBody>
-          <a:bodyPr/>
-          <a:lstStyle/>
-          <a:p>
-            <a:r>
-              <a:rPr lang="en-GB" smtClean="0"/>
-              <a:t>{%image2}</a:t>
-            </a:r>
+          <a:p>
+            <a:endParaRPr lang="en-GB" dirty="0" smtClean="0"/>
+          </a:p>
+          <a:p>
+            <a:endParaRPr lang="en-GB" dirty="0"/>
+          </a:p>
+          <a:p>
+            <a:endParaRPr lang="en-GB" dirty="0" smtClean="0"/>
+          </a:p>
+          <a:p>
+            <a:endParaRPr lang="en-GB" dirty="0"/>
+          </a:p>
+          <a:p>
+            <a:endParaRPr lang="en-GB" dirty="0" smtClean="0"/>
+          </a:p>
+          <a:p>
+            <a:endParaRPr lang="en-GB" dirty="0"/>
+          </a:p>
+          <a:p>
+            <a:endParaRPr lang="en-GB" dirty="0" smtClean="0"/>
+          </a:p>
+          <a:p>
+            <a:endParaRPr lang="en-GB" dirty="0"/>
+          </a:p>
+          <a:p>
+            <a:endParaRPr lang="en-GB" dirty="0" smtClean="0"/>
+          </a:p>
+          <a:p>
+            <a:endParaRPr lang="en-GB" dirty="0"/>
+          </a:p>
+          <a:p>
+            <a:endParaRPr lang="en-GB" dirty="0" smtClean="0"/>
+          </a:p>
+          <a:p>
+            <a:endParaRPr lang="en-GB" dirty="0"/>
+          </a:p>
+          <a:p>
+            <a:endParaRPr lang="en-GB" dirty="0" smtClean="0"/>
+          </a:p>
+          <a:p>
+            <a:endParaRPr lang="en-GB" dirty="0"/>
+          </a:p>
+          <a:p>
+            <a:endParaRPr lang="en-GB" dirty="0" smtClean="0"/>
+          </a:p>
+          <a:p>
+            <a:endParaRPr lang="en-GB"/>
+          </a:p>
+          <a:p>
             <a:endParaRPr lang="en-GB"/>
           </a:p>
         </p:txBody>

</xml_diff>